<commit_message>
sept9 rec with lab 2
</commit_message>
<xml_diff>
--- a/cs7-sept9.pptx
+++ b/cs7-sept9.pptx
@@ -121,6 +121,11 @@
       </a:defRPr>
     </a:lvl9pPr>
   </p:defaultTextStyle>
+  <p:extLst>
+    <p:ext uri="{EFAFB233-063F-42B5-8137-9DF3F51BA10A}">
+      <p15:sldGuideLst xmlns:p15="http://schemas.microsoft.com/office/powerpoint/2012/main"/>
+    </p:ext>
+  </p:extLst>
 </p:presentation>
 </file>
 
@@ -174,7 +179,7 @@
           <a:noFill/>
           <a:extLst>
             <a:ext uri="{909E8E84-426E-40dd-AFC4-6F175D3DCCD1}">
-              <a14:hiddenFill xmlns:a14="http://schemas.microsoft.com/office/drawing/2010/main" xmlns="">
+              <a14:hiddenFill xmlns="" xmlns:a14="http://schemas.microsoft.com/office/drawing/2010/main">
                 <a:solidFill>
                   <a:srgbClr val="FFFFFF"/>
                 </a:solidFill>
@@ -234,7 +239,7 @@
             </a:ln>
             <a:extLst>
               <a:ext uri="{91240B29-F687-4f45-9708-019B960494DF}">
-                <a14:hiddenLine xmlns:a14="http://schemas.microsoft.com/office/drawing/2010/main" xmlns="" w="9525">
+                <a14:hiddenLine xmlns="" xmlns:a14="http://schemas.microsoft.com/office/drawing/2010/main" w="9525">
                   <a:solidFill>
                     <a:srgbClr val="000000"/>
                   </a:solidFill>
@@ -324,7 +329,7 @@
             </a:ln>
             <a:extLst>
               <a:ext uri="{91240B29-F687-4f45-9708-019B960494DF}">
-                <a14:hiddenLine xmlns:a14="http://schemas.microsoft.com/office/drawing/2010/main" xmlns="" w="9525">
+                <a14:hiddenLine xmlns="" xmlns:a14="http://schemas.microsoft.com/office/drawing/2010/main" w="9525">
                   <a:solidFill>
                     <a:srgbClr val="000000"/>
                   </a:solidFill>
@@ -414,7 +419,7 @@
             </a:ln>
             <a:extLst>
               <a:ext uri="{91240B29-F687-4f45-9708-019B960494DF}">
-                <a14:hiddenLine xmlns:a14="http://schemas.microsoft.com/office/drawing/2010/main" xmlns="" w="9525">
+                <a14:hiddenLine xmlns="" xmlns:a14="http://schemas.microsoft.com/office/drawing/2010/main" w="9525">
                   <a:solidFill>
                     <a:srgbClr val="000000"/>
                   </a:solidFill>
@@ -448,7 +453,7 @@
             </a:ln>
             <a:extLst>
               <a:ext uri="{91240B29-F687-4f45-9708-019B960494DF}">
-                <a14:hiddenLine xmlns:a14="http://schemas.microsoft.com/office/drawing/2010/main" xmlns="" w="9525">
+                <a14:hiddenLine xmlns="" xmlns:a14="http://schemas.microsoft.com/office/drawing/2010/main" w="9525">
                   <a:solidFill>
                     <a:srgbClr val="000000"/>
                   </a:solidFill>
@@ -538,7 +543,7 @@
             </a:ln>
             <a:extLst>
               <a:ext uri="{91240B29-F687-4f45-9708-019B960494DF}">
-                <a14:hiddenLine xmlns:a14="http://schemas.microsoft.com/office/drawing/2010/main" xmlns="" w="9525">
+                <a14:hiddenLine xmlns="" xmlns:a14="http://schemas.microsoft.com/office/drawing/2010/main" w="9525">
                   <a:solidFill>
                     <a:srgbClr val="000000"/>
                   </a:solidFill>
@@ -600,7 +605,7 @@
             </a:ln>
             <a:extLst>
               <a:ext uri="{91240B29-F687-4f45-9708-019B960494DF}">
-                <a14:hiddenLine xmlns:a14="http://schemas.microsoft.com/office/drawing/2010/main" xmlns="" w="9525">
+                <a14:hiddenLine xmlns="" xmlns:a14="http://schemas.microsoft.com/office/drawing/2010/main" w="9525">
                   <a:solidFill>
                     <a:srgbClr val="000000"/>
                   </a:solidFill>
@@ -662,7 +667,7 @@
             </a:ln>
             <a:extLst>
               <a:ext uri="{91240B29-F687-4f45-9708-019B960494DF}">
-                <a14:hiddenLine xmlns:a14="http://schemas.microsoft.com/office/drawing/2010/main" xmlns="" w="9525">
+                <a14:hiddenLine xmlns="" xmlns:a14="http://schemas.microsoft.com/office/drawing/2010/main" w="9525">
                   <a:solidFill>
                     <a:srgbClr val="000000"/>
                   </a:solidFill>
@@ -752,7 +757,7 @@
             </a:ln>
             <a:extLst>
               <a:ext uri="{91240B29-F687-4f45-9708-019B960494DF}">
-                <a14:hiddenLine xmlns:a14="http://schemas.microsoft.com/office/drawing/2010/main" xmlns="" w="9525">
+                <a14:hiddenLine xmlns="" xmlns:a14="http://schemas.microsoft.com/office/drawing/2010/main" w="9525">
                   <a:solidFill>
                     <a:srgbClr val="000000"/>
                   </a:solidFill>
@@ -814,7 +819,7 @@
             </a:ln>
             <a:extLst>
               <a:ext uri="{91240B29-F687-4f45-9708-019B960494DF}">
-                <a14:hiddenLine xmlns:a14="http://schemas.microsoft.com/office/drawing/2010/main" xmlns="" w="9525">
+                <a14:hiddenLine xmlns="" xmlns:a14="http://schemas.microsoft.com/office/drawing/2010/main" w="9525">
                   <a:solidFill>
                     <a:srgbClr val="000000"/>
                   </a:solidFill>
@@ -876,7 +881,7 @@
             </a:ln>
             <a:extLst>
               <a:ext uri="{91240B29-F687-4f45-9708-019B960494DF}">
-                <a14:hiddenLine xmlns:a14="http://schemas.microsoft.com/office/drawing/2010/main" xmlns="" w="9525">
+                <a14:hiddenLine xmlns="" xmlns:a14="http://schemas.microsoft.com/office/drawing/2010/main" w="9525">
                   <a:solidFill>
                     <a:srgbClr val="000000"/>
                   </a:solidFill>
@@ -966,7 +971,7 @@
             </a:ln>
             <a:extLst>
               <a:ext uri="{91240B29-F687-4f45-9708-019B960494DF}">
-                <a14:hiddenLine xmlns:a14="http://schemas.microsoft.com/office/drawing/2010/main" xmlns="" w="9525">
+                <a14:hiddenLine xmlns="" xmlns:a14="http://schemas.microsoft.com/office/drawing/2010/main" w="9525">
                   <a:solidFill>
                     <a:srgbClr val="000000"/>
                   </a:solidFill>
@@ -1056,7 +1061,7 @@
             </a:ln>
             <a:extLst>
               <a:ext uri="{91240B29-F687-4f45-9708-019B960494DF}">
-                <a14:hiddenLine xmlns:a14="http://schemas.microsoft.com/office/drawing/2010/main" xmlns="" w="9525">
+                <a14:hiddenLine xmlns="" xmlns:a14="http://schemas.microsoft.com/office/drawing/2010/main" w="9525">
                   <a:solidFill>
                     <a:srgbClr val="000000"/>
                   </a:solidFill>
@@ -1118,7 +1123,7 @@
             </a:ln>
             <a:extLst>
               <a:ext uri="{91240B29-F687-4f45-9708-019B960494DF}">
-                <a14:hiddenLine xmlns:a14="http://schemas.microsoft.com/office/drawing/2010/main" xmlns="" w="9525">
+                <a14:hiddenLine xmlns="" xmlns:a14="http://schemas.microsoft.com/office/drawing/2010/main" w="9525">
                   <a:solidFill>
                     <a:srgbClr val="000000"/>
                   </a:solidFill>
@@ -1228,7 +1233,7 @@
             </a:ln>
             <a:extLst>
               <a:ext uri="{91240B29-F687-4f45-9708-019B960494DF}">
-                <a14:hiddenLine xmlns:a14="http://schemas.microsoft.com/office/drawing/2010/main" xmlns="" w="9525">
+                <a14:hiddenLine xmlns="" xmlns:a14="http://schemas.microsoft.com/office/drawing/2010/main" w="9525">
                   <a:solidFill>
                     <a:srgbClr val="000000"/>
                   </a:solidFill>
@@ -1290,7 +1295,7 @@
             </a:ln>
             <a:extLst>
               <a:ext uri="{91240B29-F687-4f45-9708-019B960494DF}">
-                <a14:hiddenLine xmlns:a14="http://schemas.microsoft.com/office/drawing/2010/main" xmlns="" w="9525">
+                <a14:hiddenLine xmlns="" xmlns:a14="http://schemas.microsoft.com/office/drawing/2010/main" w="9525">
                   <a:solidFill>
                     <a:srgbClr val="000000"/>
                   </a:solidFill>
@@ -1380,7 +1385,7 @@
             </a:ln>
             <a:extLst>
               <a:ext uri="{91240B29-F687-4f45-9708-019B960494DF}">
-                <a14:hiddenLine xmlns:a14="http://schemas.microsoft.com/office/drawing/2010/main" xmlns="" w="9525">
+                <a14:hiddenLine xmlns="" xmlns:a14="http://schemas.microsoft.com/office/drawing/2010/main" w="9525">
                   <a:solidFill>
                     <a:srgbClr val="000000"/>
                   </a:solidFill>
@@ -1470,7 +1475,7 @@
             </a:ln>
             <a:extLst>
               <a:ext uri="{91240B29-F687-4f45-9708-019B960494DF}">
-                <a14:hiddenLine xmlns:a14="http://schemas.microsoft.com/office/drawing/2010/main" xmlns="" w="9525">
+                <a14:hiddenLine xmlns="" xmlns:a14="http://schemas.microsoft.com/office/drawing/2010/main" w="9525">
                   <a:solidFill>
                     <a:srgbClr val="000000"/>
                   </a:solidFill>
@@ -1532,7 +1537,7 @@
             </a:ln>
             <a:extLst>
               <a:ext uri="{91240B29-F687-4f45-9708-019B960494DF}">
-                <a14:hiddenLine xmlns:a14="http://schemas.microsoft.com/office/drawing/2010/main" xmlns="" w="9525">
+                <a14:hiddenLine xmlns="" xmlns:a14="http://schemas.microsoft.com/office/drawing/2010/main" w="9525">
                   <a:solidFill>
                     <a:srgbClr val="000000"/>
                   </a:solidFill>
@@ -1622,7 +1627,7 @@
             </a:ln>
             <a:extLst>
               <a:ext uri="{91240B29-F687-4f45-9708-019B960494DF}">
-                <a14:hiddenLine xmlns:a14="http://schemas.microsoft.com/office/drawing/2010/main" xmlns="" w="9525">
+                <a14:hiddenLine xmlns="" xmlns:a14="http://schemas.microsoft.com/office/drawing/2010/main" w="9525">
                   <a:solidFill>
                     <a:srgbClr val="000000"/>
                   </a:solidFill>
@@ -1712,7 +1717,7 @@
             </a:ln>
             <a:extLst>
               <a:ext uri="{91240B29-F687-4f45-9708-019B960494DF}">
-                <a14:hiddenLine xmlns:a14="http://schemas.microsoft.com/office/drawing/2010/main" xmlns="" w="9525">
+                <a14:hiddenLine xmlns="" xmlns:a14="http://schemas.microsoft.com/office/drawing/2010/main" w="9525">
                   <a:solidFill>
                     <a:srgbClr val="000000"/>
                   </a:solidFill>
@@ -1768,7 +1773,7 @@
             </a:ln>
             <a:extLst>
               <a:ext uri="{91240B29-F687-4f45-9708-019B960494DF}">
-                <a14:hiddenLine xmlns:a14="http://schemas.microsoft.com/office/drawing/2010/main" xmlns="" w="9525">
+                <a14:hiddenLine xmlns="" xmlns:a14="http://schemas.microsoft.com/office/drawing/2010/main" w="9525">
                   <a:solidFill>
                     <a:srgbClr val="000000"/>
                   </a:solidFill>
@@ -1858,7 +1863,7 @@
             </a:ln>
             <a:extLst>
               <a:ext uri="{91240B29-F687-4f45-9708-019B960494DF}">
-                <a14:hiddenLine xmlns:a14="http://schemas.microsoft.com/office/drawing/2010/main" xmlns="" w="9525">
+                <a14:hiddenLine xmlns="" xmlns:a14="http://schemas.microsoft.com/office/drawing/2010/main" w="9525">
                   <a:solidFill>
                     <a:srgbClr val="000000"/>
                   </a:solidFill>
@@ -1914,7 +1919,7 @@
             </a:ln>
             <a:extLst>
               <a:ext uri="{91240B29-F687-4f45-9708-019B960494DF}">
-                <a14:hiddenLine xmlns:a14="http://schemas.microsoft.com/office/drawing/2010/main" xmlns="" w="9525">
+                <a14:hiddenLine xmlns="" xmlns:a14="http://schemas.microsoft.com/office/drawing/2010/main" w="9525">
                   <a:solidFill>
                     <a:srgbClr val="000000"/>
                   </a:solidFill>
@@ -2004,7 +2009,7 @@
             </a:ln>
             <a:extLst>
               <a:ext uri="{91240B29-F687-4f45-9708-019B960494DF}">
-                <a14:hiddenLine xmlns:a14="http://schemas.microsoft.com/office/drawing/2010/main" xmlns="" w="9525">
+                <a14:hiddenLine xmlns="" xmlns:a14="http://schemas.microsoft.com/office/drawing/2010/main" w="9525">
                   <a:solidFill>
                     <a:srgbClr val="000000"/>
                   </a:solidFill>
@@ -2072,7 +2077,7 @@
             </a:ln>
             <a:extLst>
               <a:ext uri="{91240B29-F687-4f45-9708-019B960494DF}">
-                <a14:hiddenLine xmlns:a14="http://schemas.microsoft.com/office/drawing/2010/main" xmlns="" w="9525">
+                <a14:hiddenLine xmlns="" xmlns:a14="http://schemas.microsoft.com/office/drawing/2010/main" w="9525">
                   <a:solidFill>
                     <a:srgbClr val="000000"/>
                   </a:solidFill>
@@ -2162,7 +2167,7 @@
             </a:ln>
             <a:extLst>
               <a:ext uri="{91240B29-F687-4f45-9708-019B960494DF}">
-                <a14:hiddenLine xmlns:a14="http://schemas.microsoft.com/office/drawing/2010/main" xmlns="" w="9525">
+                <a14:hiddenLine xmlns="" xmlns:a14="http://schemas.microsoft.com/office/drawing/2010/main" w="9525">
                   <a:solidFill>
                     <a:srgbClr val="000000"/>
                   </a:solidFill>
@@ -2230,7 +2235,7 @@
             </a:ln>
             <a:extLst>
               <a:ext uri="{91240B29-F687-4f45-9708-019B960494DF}">
-                <a14:hiddenLine xmlns:a14="http://schemas.microsoft.com/office/drawing/2010/main" xmlns="" w="9525">
+                <a14:hiddenLine xmlns="" xmlns:a14="http://schemas.microsoft.com/office/drawing/2010/main" w="9525">
                   <a:solidFill>
                     <a:srgbClr val="000000"/>
                   </a:solidFill>
@@ -2320,7 +2325,7 @@
             </a:ln>
             <a:extLst>
               <a:ext uri="{91240B29-F687-4f45-9708-019B960494DF}">
-                <a14:hiddenLine xmlns:a14="http://schemas.microsoft.com/office/drawing/2010/main" xmlns="" w="9525">
+                <a14:hiddenLine xmlns="" xmlns:a14="http://schemas.microsoft.com/office/drawing/2010/main" w="9525">
                   <a:solidFill>
                     <a:srgbClr val="000000"/>
                   </a:solidFill>
@@ -2354,7 +2359,7 @@
             </a:ln>
             <a:extLst>
               <a:ext uri="{91240B29-F687-4f45-9708-019B960494DF}">
-                <a14:hiddenLine xmlns:a14="http://schemas.microsoft.com/office/drawing/2010/main" xmlns="" w="9525">
+                <a14:hiddenLine xmlns="" xmlns:a14="http://schemas.microsoft.com/office/drawing/2010/main" w="9525">
                   <a:solidFill>
                     <a:srgbClr val="000000"/>
                   </a:solidFill>
@@ -2444,7 +2449,7 @@
             </a:ln>
             <a:extLst>
               <a:ext uri="{91240B29-F687-4f45-9708-019B960494DF}">
-                <a14:hiddenLine xmlns:a14="http://schemas.microsoft.com/office/drawing/2010/main" xmlns="" w="9525">
+                <a14:hiddenLine xmlns="" xmlns:a14="http://schemas.microsoft.com/office/drawing/2010/main" w="9525">
                   <a:solidFill>
                     <a:srgbClr val="000000"/>
                   </a:solidFill>
@@ -2506,7 +2511,7 @@
             </a:ln>
             <a:extLst>
               <a:ext uri="{91240B29-F687-4f45-9708-019B960494DF}">
-                <a14:hiddenLine xmlns:a14="http://schemas.microsoft.com/office/drawing/2010/main" xmlns="" w="9525">
+                <a14:hiddenLine xmlns="" xmlns:a14="http://schemas.microsoft.com/office/drawing/2010/main" w="9525">
                   <a:solidFill>
                     <a:srgbClr val="000000"/>
                   </a:solidFill>
@@ -2568,7 +2573,7 @@
             </a:ln>
             <a:extLst>
               <a:ext uri="{91240B29-F687-4f45-9708-019B960494DF}">
-                <a14:hiddenLine xmlns:a14="http://schemas.microsoft.com/office/drawing/2010/main" xmlns="" w="9525">
+                <a14:hiddenLine xmlns="" xmlns:a14="http://schemas.microsoft.com/office/drawing/2010/main" w="9525">
                   <a:solidFill>
                     <a:srgbClr val="000000"/>
                   </a:solidFill>
@@ -2658,7 +2663,7 @@
             </a:ln>
             <a:extLst>
               <a:ext uri="{91240B29-F687-4f45-9708-019B960494DF}">
-                <a14:hiddenLine xmlns:a14="http://schemas.microsoft.com/office/drawing/2010/main" xmlns="" w="9525">
+                <a14:hiddenLine xmlns="" xmlns:a14="http://schemas.microsoft.com/office/drawing/2010/main" w="9525">
                   <a:solidFill>
                     <a:srgbClr val="000000"/>
                   </a:solidFill>
@@ -2726,7 +2731,7 @@
             </a:ln>
             <a:extLst>
               <a:ext uri="{91240B29-F687-4f45-9708-019B960494DF}">
-                <a14:hiddenLine xmlns:a14="http://schemas.microsoft.com/office/drawing/2010/main" xmlns="" w="9525">
+                <a14:hiddenLine xmlns="" xmlns:a14="http://schemas.microsoft.com/office/drawing/2010/main" w="9525">
                   <a:solidFill>
                     <a:srgbClr val="000000"/>
                   </a:solidFill>
@@ -2788,7 +2793,7 @@
             </a:ln>
             <a:extLst>
               <a:ext uri="{91240B29-F687-4f45-9708-019B960494DF}">
-                <a14:hiddenLine xmlns:a14="http://schemas.microsoft.com/office/drawing/2010/main" xmlns="" w="9525">
+                <a14:hiddenLine xmlns="" xmlns:a14="http://schemas.microsoft.com/office/drawing/2010/main" w="9525">
                   <a:solidFill>
                     <a:srgbClr val="000000"/>
                   </a:solidFill>
@@ -2878,7 +2883,7 @@
             </a:ln>
             <a:extLst>
               <a:ext uri="{91240B29-F687-4f45-9708-019B960494DF}">
-                <a14:hiddenLine xmlns:a14="http://schemas.microsoft.com/office/drawing/2010/main" xmlns="" w="9525">
+                <a14:hiddenLine xmlns="" xmlns:a14="http://schemas.microsoft.com/office/drawing/2010/main" w="9525">
                   <a:solidFill>
                     <a:srgbClr val="000000"/>
                   </a:solidFill>
@@ -2940,7 +2945,7 @@
             </a:ln>
             <a:extLst>
               <a:ext uri="{91240B29-F687-4f45-9708-019B960494DF}">
-                <a14:hiddenLine xmlns:a14="http://schemas.microsoft.com/office/drawing/2010/main" xmlns="" w="9525">
+                <a14:hiddenLine xmlns="" xmlns:a14="http://schemas.microsoft.com/office/drawing/2010/main" w="9525">
                   <a:solidFill>
                     <a:srgbClr val="000000"/>
                   </a:solidFill>
@@ -3030,7 +3035,7 @@
             </a:ln>
             <a:extLst>
               <a:ext uri="{91240B29-F687-4f45-9708-019B960494DF}">
-                <a14:hiddenLine xmlns:a14="http://schemas.microsoft.com/office/drawing/2010/main" xmlns="" w="9525">
+                <a14:hiddenLine xmlns="" xmlns:a14="http://schemas.microsoft.com/office/drawing/2010/main" w="9525">
                   <a:solidFill>
                     <a:srgbClr val="000000"/>
                   </a:solidFill>
@@ -3092,7 +3097,7 @@
             </a:ln>
             <a:extLst>
               <a:ext uri="{91240B29-F687-4f45-9708-019B960494DF}">
-                <a14:hiddenLine xmlns:a14="http://schemas.microsoft.com/office/drawing/2010/main" xmlns="" w="9525">
+                <a14:hiddenLine xmlns="" xmlns:a14="http://schemas.microsoft.com/office/drawing/2010/main" w="9525">
                   <a:solidFill>
                     <a:srgbClr val="000000"/>
                   </a:solidFill>
@@ -3182,7 +3187,7 @@
             </a:ln>
             <a:extLst>
               <a:ext uri="{91240B29-F687-4f45-9708-019B960494DF}">
-                <a14:hiddenLine xmlns:a14="http://schemas.microsoft.com/office/drawing/2010/main" xmlns="" w="9525">
+                <a14:hiddenLine xmlns="" xmlns:a14="http://schemas.microsoft.com/office/drawing/2010/main" w="9525">
                   <a:solidFill>
                     <a:srgbClr val="000000"/>
                   </a:solidFill>
@@ -3216,7 +3221,7 @@
             </a:ln>
             <a:extLst>
               <a:ext uri="{91240B29-F687-4f45-9708-019B960494DF}">
-                <a14:hiddenLine xmlns:a14="http://schemas.microsoft.com/office/drawing/2010/main" xmlns="" w="9525">
+                <a14:hiddenLine xmlns="" xmlns:a14="http://schemas.microsoft.com/office/drawing/2010/main" w="9525">
                   <a:solidFill>
                     <a:srgbClr val="000000"/>
                   </a:solidFill>
@@ -3281,7 +3286,7 @@
             </a:ln>
             <a:extLst>
               <a:ext uri="{91240B29-F687-4f45-9708-019B960494DF}">
-                <a14:hiddenLine xmlns:a14="http://schemas.microsoft.com/office/drawing/2010/main" xmlns="" w="9525">
+                <a14:hiddenLine xmlns="" xmlns:a14="http://schemas.microsoft.com/office/drawing/2010/main" w="9525">
                   <a:solidFill>
                     <a:srgbClr val="000000"/>
                   </a:solidFill>
@@ -3371,7 +3376,7 @@
             </a:ln>
             <a:extLst>
               <a:ext uri="{91240B29-F687-4f45-9708-019B960494DF}">
-                <a14:hiddenLine xmlns:a14="http://schemas.microsoft.com/office/drawing/2010/main" xmlns="" w="9525">
+                <a14:hiddenLine xmlns="" xmlns:a14="http://schemas.microsoft.com/office/drawing/2010/main" w="9525">
                   <a:solidFill>
                     <a:srgbClr val="000000"/>
                   </a:solidFill>
@@ -3433,7 +3438,7 @@
             </a:ln>
             <a:extLst>
               <a:ext uri="{91240B29-F687-4f45-9708-019B960494DF}">
-                <a14:hiddenLine xmlns:a14="http://schemas.microsoft.com/office/drawing/2010/main" xmlns="" w="9525">
+                <a14:hiddenLine xmlns="" xmlns:a14="http://schemas.microsoft.com/office/drawing/2010/main" w="9525">
                   <a:solidFill>
                     <a:srgbClr val="000000"/>
                   </a:solidFill>
@@ -3523,7 +3528,7 @@
             </a:ln>
             <a:extLst>
               <a:ext uri="{91240B29-F687-4f45-9708-019B960494DF}">
-                <a14:hiddenLine xmlns:a14="http://schemas.microsoft.com/office/drawing/2010/main" xmlns="" w="9525">
+                <a14:hiddenLine xmlns="" xmlns:a14="http://schemas.microsoft.com/office/drawing/2010/main" w="9525">
                   <a:solidFill>
                     <a:srgbClr val="000000"/>
                   </a:solidFill>
@@ -3613,7 +3618,7 @@
             </a:ln>
             <a:extLst>
               <a:ext uri="{91240B29-F687-4f45-9708-019B960494DF}">
-                <a14:hiddenLine xmlns:a14="http://schemas.microsoft.com/office/drawing/2010/main" xmlns="" w="9525">
+                <a14:hiddenLine xmlns="" xmlns:a14="http://schemas.microsoft.com/office/drawing/2010/main" w="9525">
                   <a:solidFill>
                     <a:srgbClr val="000000"/>
                   </a:solidFill>
@@ -3678,7 +3683,7 @@
             </a:ln>
             <a:extLst>
               <a:ext uri="{91240B29-F687-4f45-9708-019B960494DF}">
-                <a14:hiddenLine xmlns:a14="http://schemas.microsoft.com/office/drawing/2010/main" xmlns="" w="9525">
+                <a14:hiddenLine xmlns="" xmlns:a14="http://schemas.microsoft.com/office/drawing/2010/main" w="9525">
                   <a:solidFill>
                     <a:srgbClr val="000000"/>
                   </a:solidFill>
@@ -3740,7 +3745,7 @@
             </a:ln>
             <a:extLst>
               <a:ext uri="{91240B29-F687-4f45-9708-019B960494DF}">
-                <a14:hiddenLine xmlns:a14="http://schemas.microsoft.com/office/drawing/2010/main" xmlns="" w="9525">
+                <a14:hiddenLine xmlns="" xmlns:a14="http://schemas.microsoft.com/office/drawing/2010/main" w="9525">
                   <a:solidFill>
                     <a:srgbClr val="000000"/>
                   </a:solidFill>
@@ -3830,7 +3835,7 @@
             </a:ln>
             <a:extLst>
               <a:ext uri="{91240B29-F687-4f45-9708-019B960494DF}">
-                <a14:hiddenLine xmlns:a14="http://schemas.microsoft.com/office/drawing/2010/main" xmlns="" w="9525">
+                <a14:hiddenLine xmlns="" xmlns:a14="http://schemas.microsoft.com/office/drawing/2010/main" w="9525">
                   <a:solidFill>
                     <a:srgbClr val="000000"/>
                   </a:solidFill>
@@ -3920,7 +3925,7 @@
             </a:ln>
             <a:extLst>
               <a:ext uri="{91240B29-F687-4f45-9708-019B960494DF}">
-                <a14:hiddenLine xmlns:a14="http://schemas.microsoft.com/office/drawing/2010/main" xmlns="" w="9525">
+                <a14:hiddenLine xmlns="" xmlns:a14="http://schemas.microsoft.com/office/drawing/2010/main" w="9525">
                   <a:solidFill>
                     <a:srgbClr val="000000"/>
                   </a:solidFill>
@@ -3982,7 +3987,7 @@
             </a:ln>
             <a:extLst>
               <a:ext uri="{91240B29-F687-4f45-9708-019B960494DF}">
-                <a14:hiddenLine xmlns:a14="http://schemas.microsoft.com/office/drawing/2010/main" xmlns="" w="9525">
+                <a14:hiddenLine xmlns="" xmlns:a14="http://schemas.microsoft.com/office/drawing/2010/main" w="9525">
                   <a:solidFill>
                     <a:srgbClr val="000000"/>
                   </a:solidFill>
@@ -4102,7 +4107,7 @@
             </a:ln>
             <a:extLst>
               <a:ext uri="{91240B29-F687-4f45-9708-019B960494DF}">
-                <a14:hiddenLine xmlns:a14="http://schemas.microsoft.com/office/drawing/2010/main" xmlns="" w="9525">
+                <a14:hiddenLine xmlns="" xmlns:a14="http://schemas.microsoft.com/office/drawing/2010/main" w="9525">
                   <a:solidFill>
                     <a:srgbClr val="000000"/>
                   </a:solidFill>
@@ -4170,7 +4175,7 @@
             </a:ln>
             <a:extLst>
               <a:ext uri="{91240B29-F687-4f45-9708-019B960494DF}">
-                <a14:hiddenLine xmlns:a14="http://schemas.microsoft.com/office/drawing/2010/main" xmlns="" w="9525">
+                <a14:hiddenLine xmlns="" xmlns:a14="http://schemas.microsoft.com/office/drawing/2010/main" w="9525">
                   <a:solidFill>
                     <a:srgbClr val="000000"/>
                   </a:solidFill>
@@ -4260,7 +4265,7 @@
             </a:ln>
             <a:extLst>
               <a:ext uri="{91240B29-F687-4f45-9708-019B960494DF}">
-                <a14:hiddenLine xmlns:a14="http://schemas.microsoft.com/office/drawing/2010/main" xmlns="" w="9525">
+                <a14:hiddenLine xmlns="" xmlns:a14="http://schemas.microsoft.com/office/drawing/2010/main" w="9525">
                   <a:solidFill>
                     <a:srgbClr val="000000"/>
                   </a:solidFill>
@@ -4400,7 +4405,7 @@
           <a:p>
             <a:fld id="{48A87A34-81AB-432B-8DAE-1953F412C126}" type="datetimeFigureOut">
               <a:rPr lang="en-US" dirty="0"/>
-              <a:t>9/8/2021</a:t>
+              <a:t>9/9/2021</a:t>
             </a:fld>
             <a:endParaRPr lang="en-US" dirty="0"/>
           </a:p>
@@ -4662,7 +4667,7 @@
           <a:p>
             <a:fld id="{48A87A34-81AB-432B-8DAE-1953F412C126}" type="datetimeFigureOut">
               <a:rPr lang="en-US" dirty="0"/>
-              <a:t>9/8/2021</a:t>
+              <a:t>9/9/2021</a:t>
             </a:fld>
             <a:endParaRPr lang="en-US" dirty="0"/>
           </a:p>
@@ -4853,7 +4858,7 @@
           <a:p>
             <a:fld id="{48A87A34-81AB-432B-8DAE-1953F412C126}" type="datetimeFigureOut">
               <a:rPr lang="en-US" dirty="0"/>
-              <a:t>9/8/2021</a:t>
+              <a:t>9/9/2021</a:t>
             </a:fld>
             <a:endParaRPr lang="en-US" dirty="0"/>
           </a:p>
@@ -5111,7 +5116,7 @@
           <a:p>
             <a:fld id="{48A87A34-81AB-432B-8DAE-1953F412C126}" type="datetimeFigureOut">
               <a:rPr lang="en-US" dirty="0"/>
-              <a:t>9/8/2021</a:t>
+              <a:t>9/9/2021</a:t>
             </a:fld>
             <a:endParaRPr lang="en-US" dirty="0"/>
           </a:p>
@@ -5540,7 +5545,7 @@
           <a:p>
             <a:fld id="{48A87A34-81AB-432B-8DAE-1953F412C126}" type="datetimeFigureOut">
               <a:rPr lang="en-US" dirty="0"/>
-              <a:t>9/8/2021</a:t>
+              <a:t>9/9/2021</a:t>
             </a:fld>
             <a:endParaRPr lang="en-US" dirty="0"/>
           </a:p>
@@ -6081,7 +6086,7 @@
           <a:p>
             <a:fld id="{48A87A34-81AB-432B-8DAE-1953F412C126}" type="datetimeFigureOut">
               <a:rPr lang="en-US" dirty="0"/>
-              <a:t>9/8/2021</a:t>
+              <a:t>9/9/2021</a:t>
             </a:fld>
             <a:endParaRPr lang="en-US" dirty="0"/>
           </a:p>
@@ -6796,7 +6801,7 @@
           <a:p>
             <a:fld id="{48A87A34-81AB-432B-8DAE-1953F412C126}" type="datetimeFigureOut">
               <a:rPr lang="en-US" dirty="0"/>
-              <a:t>9/8/2021</a:t>
+              <a:t>9/9/2021</a:t>
             </a:fld>
             <a:endParaRPr lang="en-US" dirty="0"/>
           </a:p>
@@ -6961,7 +6966,7 @@
           <a:p>
             <a:fld id="{48A87A34-81AB-432B-8DAE-1953F412C126}" type="datetimeFigureOut">
               <a:rPr lang="en-US" dirty="0"/>
-              <a:t>9/8/2021</a:t>
+              <a:t>9/9/2021</a:t>
             </a:fld>
             <a:endParaRPr lang="en-US" dirty="0"/>
           </a:p>
@@ -7136,7 +7141,7 @@
           <a:p>
             <a:fld id="{48A87A34-81AB-432B-8DAE-1953F412C126}" type="datetimeFigureOut">
               <a:rPr lang="en-US" dirty="0"/>
-              <a:t>9/8/2021</a:t>
+              <a:t>9/9/2021</a:t>
             </a:fld>
             <a:endParaRPr lang="en-US" dirty="0"/>
           </a:p>
@@ -7301,7 +7306,7 @@
           <a:p>
             <a:fld id="{48A87A34-81AB-432B-8DAE-1953F412C126}" type="datetimeFigureOut">
               <a:rPr lang="en-US" dirty="0"/>
-              <a:t>9/8/2021</a:t>
+              <a:t>9/9/2021</a:t>
             </a:fld>
             <a:endParaRPr lang="en-US" dirty="0"/>
           </a:p>
@@ -7546,7 +7551,7 @@
           <a:p>
             <a:fld id="{48A87A34-81AB-432B-8DAE-1953F412C126}" type="datetimeFigureOut">
               <a:rPr lang="en-US" dirty="0"/>
-              <a:t>9/8/2021</a:t>
+              <a:t>9/9/2021</a:t>
             </a:fld>
             <a:endParaRPr lang="en-US" dirty="0"/>
           </a:p>
@@ -7773,7 +7778,7 @@
           <a:p>
             <a:fld id="{48A87A34-81AB-432B-8DAE-1953F412C126}" type="datetimeFigureOut">
               <a:rPr lang="en-US" dirty="0"/>
-              <a:t>9/8/2021</a:t>
+              <a:t>9/9/2021</a:t>
             </a:fld>
             <a:endParaRPr lang="en-US" dirty="0"/>
           </a:p>
@@ -8149,7 +8154,7 @@
           <a:p>
             <a:fld id="{48A87A34-81AB-432B-8DAE-1953F412C126}" type="datetimeFigureOut">
               <a:rPr lang="en-US" dirty="0"/>
-              <a:t>9/8/2021</a:t>
+              <a:t>9/9/2021</a:t>
             </a:fld>
             <a:endParaRPr lang="en-US" dirty="0"/>
           </a:p>
@@ -8262,7 +8267,7 @@
           <a:p>
             <a:fld id="{48A87A34-81AB-432B-8DAE-1953F412C126}" type="datetimeFigureOut">
               <a:rPr lang="en-US" dirty="0"/>
-              <a:t>9/8/2021</a:t>
+              <a:t>9/9/2021</a:t>
             </a:fld>
             <a:endParaRPr lang="en-US" dirty="0"/>
           </a:p>
@@ -8352,7 +8357,7 @@
           <a:p>
             <a:fld id="{48A87A34-81AB-432B-8DAE-1953F412C126}" type="datetimeFigureOut">
               <a:rPr lang="en-US" dirty="0"/>
-              <a:t>9/8/2021</a:t>
+              <a:t>9/9/2021</a:t>
             </a:fld>
             <a:endParaRPr lang="en-US" dirty="0"/>
           </a:p>
@@ -8596,7 +8601,7 @@
           <a:p>
             <a:fld id="{48A87A34-81AB-432B-8DAE-1953F412C126}" type="datetimeFigureOut">
               <a:rPr lang="en-US" dirty="0"/>
-              <a:t>9/8/2021</a:t>
+              <a:t>9/9/2021</a:t>
             </a:fld>
             <a:endParaRPr lang="en-US" dirty="0"/>
           </a:p>
@@ -8871,7 +8876,7 @@
           <a:p>
             <a:fld id="{48A87A34-81AB-432B-8DAE-1953F412C126}" type="datetimeFigureOut">
               <a:rPr lang="en-US" dirty="0"/>
-              <a:t>9/8/2021</a:t>
+              <a:t>9/9/2021</a:t>
             </a:fld>
             <a:endParaRPr lang="en-US" dirty="0"/>
           </a:p>
@@ -8982,7 +8987,7 @@
           <a:noFill/>
           <a:extLst>
             <a:ext uri="{909E8E84-426E-40dd-AFC4-6F175D3DCCD1}">
-              <a14:hiddenFill xmlns:a14="http://schemas.microsoft.com/office/drawing/2010/main" xmlns="">
+              <a14:hiddenFill xmlns="" xmlns:a14="http://schemas.microsoft.com/office/drawing/2010/main">
                 <a:solidFill>
                   <a:srgbClr val="FFFFFF"/>
                 </a:solidFill>
@@ -9056,7 +9061,7 @@
               </a:ln>
               <a:extLst>
                 <a:ext uri="{91240B29-F687-4f45-9708-019B960494DF}">
-                  <a14:hiddenLine xmlns:a14="http://schemas.microsoft.com/office/drawing/2010/main" xmlns="" w="9525">
+                  <a14:hiddenLine xmlns="" xmlns:a14="http://schemas.microsoft.com/office/drawing/2010/main" w="9525">
                     <a:solidFill>
                       <a:srgbClr val="000000"/>
                     </a:solidFill>
@@ -9146,7 +9151,7 @@
               </a:ln>
               <a:extLst>
                 <a:ext uri="{91240B29-F687-4f45-9708-019B960494DF}">
-                  <a14:hiddenLine xmlns:a14="http://schemas.microsoft.com/office/drawing/2010/main" xmlns="" w="9525">
+                  <a14:hiddenLine xmlns="" xmlns:a14="http://schemas.microsoft.com/office/drawing/2010/main" w="9525">
                     <a:solidFill>
                       <a:srgbClr val="000000"/>
                     </a:solidFill>
@@ -9236,7 +9241,7 @@
               </a:ln>
               <a:extLst>
                 <a:ext uri="{91240B29-F687-4f45-9708-019B960494DF}">
-                  <a14:hiddenLine xmlns:a14="http://schemas.microsoft.com/office/drawing/2010/main" xmlns="" w="9525">
+                  <a14:hiddenLine xmlns="" xmlns:a14="http://schemas.microsoft.com/office/drawing/2010/main" w="9525">
                     <a:solidFill>
                       <a:srgbClr val="000000"/>
                     </a:solidFill>
@@ -9298,7 +9303,7 @@
               </a:ln>
               <a:extLst>
                 <a:ext uri="{91240B29-F687-4f45-9708-019B960494DF}">
-                  <a14:hiddenLine xmlns:a14="http://schemas.microsoft.com/office/drawing/2010/main" xmlns="" w="9525">
+                  <a14:hiddenLine xmlns="" xmlns:a14="http://schemas.microsoft.com/office/drawing/2010/main" w="9525">
                     <a:solidFill>
                       <a:srgbClr val="000000"/>
                     </a:solidFill>
@@ -9388,7 +9393,7 @@
               </a:ln>
               <a:extLst>
                 <a:ext uri="{91240B29-F687-4f45-9708-019B960494DF}">
-                  <a14:hiddenLine xmlns:a14="http://schemas.microsoft.com/office/drawing/2010/main" xmlns="" w="9525">
+                  <a14:hiddenLine xmlns="" xmlns:a14="http://schemas.microsoft.com/office/drawing/2010/main" w="9525">
                     <a:solidFill>
                       <a:srgbClr val="000000"/>
                     </a:solidFill>
@@ -9450,7 +9455,7 @@
               </a:ln>
               <a:extLst>
                 <a:ext uri="{91240B29-F687-4f45-9708-019B960494DF}">
-                  <a14:hiddenLine xmlns:a14="http://schemas.microsoft.com/office/drawing/2010/main" xmlns="" w="9525">
+                  <a14:hiddenLine xmlns="" xmlns:a14="http://schemas.microsoft.com/office/drawing/2010/main" w="9525">
                     <a:solidFill>
                       <a:srgbClr val="000000"/>
                     </a:solidFill>
@@ -9512,7 +9517,7 @@
               </a:ln>
               <a:extLst>
                 <a:ext uri="{91240B29-F687-4f45-9708-019B960494DF}">
-                  <a14:hiddenLine xmlns:a14="http://schemas.microsoft.com/office/drawing/2010/main" xmlns="" w="9525">
+                  <a14:hiddenLine xmlns="" xmlns:a14="http://schemas.microsoft.com/office/drawing/2010/main" w="9525">
                     <a:solidFill>
                       <a:srgbClr val="000000"/>
                     </a:solidFill>
@@ -9602,7 +9607,7 @@
               </a:ln>
               <a:extLst>
                 <a:ext uri="{91240B29-F687-4f45-9708-019B960494DF}">
-                  <a14:hiddenLine xmlns:a14="http://schemas.microsoft.com/office/drawing/2010/main" xmlns="" w="9525">
+                  <a14:hiddenLine xmlns="" xmlns:a14="http://schemas.microsoft.com/office/drawing/2010/main" w="9525">
                     <a:solidFill>
                       <a:srgbClr val="000000"/>
                     </a:solidFill>
@@ -9692,7 +9697,7 @@
               </a:ln>
               <a:extLst>
                 <a:ext uri="{91240B29-F687-4f45-9708-019B960494DF}">
-                  <a14:hiddenLine xmlns:a14="http://schemas.microsoft.com/office/drawing/2010/main" xmlns="" w="9525">
+                  <a14:hiddenLine xmlns="" xmlns:a14="http://schemas.microsoft.com/office/drawing/2010/main" w="9525">
                     <a:solidFill>
                       <a:srgbClr val="000000"/>
                     </a:solidFill>
@@ -9754,7 +9759,7 @@
               </a:ln>
               <a:extLst>
                 <a:ext uri="{91240B29-F687-4f45-9708-019B960494DF}">
-                  <a14:hiddenLine xmlns:a14="http://schemas.microsoft.com/office/drawing/2010/main" xmlns="" w="9525">
+                  <a14:hiddenLine xmlns="" xmlns:a14="http://schemas.microsoft.com/office/drawing/2010/main" w="9525">
                     <a:solidFill>
                       <a:srgbClr val="000000"/>
                     </a:solidFill>
@@ -9864,7 +9869,7 @@
               </a:ln>
               <a:extLst>
                 <a:ext uri="{91240B29-F687-4f45-9708-019B960494DF}">
-                  <a14:hiddenLine xmlns:a14="http://schemas.microsoft.com/office/drawing/2010/main" xmlns="" w="9525">
+                  <a14:hiddenLine xmlns="" xmlns:a14="http://schemas.microsoft.com/office/drawing/2010/main" w="9525">
                     <a:solidFill>
                       <a:srgbClr val="000000"/>
                     </a:solidFill>
@@ -9948,7 +9953,7 @@
               </a:ln>
               <a:extLst>
                 <a:ext uri="{91240B29-F687-4f45-9708-019B960494DF}">
-                  <a14:hiddenLine xmlns:a14="http://schemas.microsoft.com/office/drawing/2010/main" xmlns="" w="9525">
+                  <a14:hiddenLine xmlns="" xmlns:a14="http://schemas.microsoft.com/office/drawing/2010/main" w="9525">
                     <a:solidFill>
                       <a:srgbClr val="000000"/>
                     </a:solidFill>
@@ -10010,7 +10015,7 @@
               </a:ln>
               <a:extLst>
                 <a:ext uri="{91240B29-F687-4f45-9708-019B960494DF}">
-                  <a14:hiddenLine xmlns:a14="http://schemas.microsoft.com/office/drawing/2010/main" xmlns="" w="9525">
+                  <a14:hiddenLine xmlns="" xmlns:a14="http://schemas.microsoft.com/office/drawing/2010/main" w="9525">
                     <a:solidFill>
                       <a:srgbClr val="000000"/>
                     </a:solidFill>
@@ -10072,7 +10077,7 @@
               </a:ln>
               <a:extLst>
                 <a:ext uri="{91240B29-F687-4f45-9708-019B960494DF}">
-                  <a14:hiddenLine xmlns:a14="http://schemas.microsoft.com/office/drawing/2010/main" xmlns="" w="9525">
+                  <a14:hiddenLine xmlns="" xmlns:a14="http://schemas.microsoft.com/office/drawing/2010/main" w="9525">
                     <a:solidFill>
                       <a:srgbClr val="000000"/>
                     </a:solidFill>
@@ -10162,7 +10167,7 @@
               </a:ln>
               <a:extLst>
                 <a:ext uri="{91240B29-F687-4f45-9708-019B960494DF}">
-                  <a14:hiddenLine xmlns:a14="http://schemas.microsoft.com/office/drawing/2010/main" xmlns="" w="9525">
+                  <a14:hiddenLine xmlns="" xmlns:a14="http://schemas.microsoft.com/office/drawing/2010/main" w="9525">
                     <a:solidFill>
                       <a:srgbClr val="000000"/>
                     </a:solidFill>
@@ -10196,7 +10201,7 @@
               </a:ln>
               <a:extLst>
                 <a:ext uri="{91240B29-F687-4f45-9708-019B960494DF}">
-                  <a14:hiddenLine xmlns:a14="http://schemas.microsoft.com/office/drawing/2010/main" xmlns="" w="9525">
+                  <a14:hiddenLine xmlns="" xmlns:a14="http://schemas.microsoft.com/office/drawing/2010/main" w="9525">
                     <a:solidFill>
                       <a:srgbClr val="000000"/>
                     </a:solidFill>
@@ -10261,7 +10266,7 @@
               </a:ln>
               <a:extLst>
                 <a:ext uri="{91240B29-F687-4f45-9708-019B960494DF}">
-                  <a14:hiddenLine xmlns:a14="http://schemas.microsoft.com/office/drawing/2010/main" xmlns="" w="9525">
+                  <a14:hiddenLine xmlns="" xmlns:a14="http://schemas.microsoft.com/office/drawing/2010/main" w="9525">
                     <a:solidFill>
                       <a:srgbClr val="000000"/>
                     </a:solidFill>
@@ -10351,7 +10356,7 @@
               </a:ln>
               <a:extLst>
                 <a:ext uri="{91240B29-F687-4f45-9708-019B960494DF}">
-                  <a14:hiddenLine xmlns:a14="http://schemas.microsoft.com/office/drawing/2010/main" xmlns="" w="9525">
+                  <a14:hiddenLine xmlns="" xmlns:a14="http://schemas.microsoft.com/office/drawing/2010/main" w="9525">
                     <a:solidFill>
                       <a:srgbClr val="000000"/>
                     </a:solidFill>
@@ -10413,7 +10418,7 @@
               </a:ln>
               <a:extLst>
                 <a:ext uri="{91240B29-F687-4f45-9708-019B960494DF}">
-                  <a14:hiddenLine xmlns:a14="http://schemas.microsoft.com/office/drawing/2010/main" xmlns="" w="9525">
+                  <a14:hiddenLine xmlns="" xmlns:a14="http://schemas.microsoft.com/office/drawing/2010/main" w="9525">
                     <a:solidFill>
                       <a:srgbClr val="000000"/>
                     </a:solidFill>
@@ -10503,7 +10508,7 @@
               </a:ln>
               <a:extLst>
                 <a:ext uri="{91240B29-F687-4f45-9708-019B960494DF}">
-                  <a14:hiddenLine xmlns:a14="http://schemas.microsoft.com/office/drawing/2010/main" xmlns="" w="9525">
+                  <a14:hiddenLine xmlns="" xmlns:a14="http://schemas.microsoft.com/office/drawing/2010/main" w="9525">
                     <a:solidFill>
                       <a:srgbClr val="000000"/>
                     </a:solidFill>
@@ -10568,7 +10573,7 @@
               </a:ln>
               <a:extLst>
                 <a:ext uri="{91240B29-F687-4f45-9708-019B960494DF}">
-                  <a14:hiddenLine xmlns:a14="http://schemas.microsoft.com/office/drawing/2010/main" xmlns="" w="9525">
+                  <a14:hiddenLine xmlns="" xmlns:a14="http://schemas.microsoft.com/office/drawing/2010/main" w="9525">
                     <a:solidFill>
                       <a:srgbClr val="000000"/>
                     </a:solidFill>
@@ -10630,7 +10635,7 @@
               </a:ln>
               <a:extLst>
                 <a:ext uri="{91240B29-F687-4f45-9708-019B960494DF}">
-                  <a14:hiddenLine xmlns:a14="http://schemas.microsoft.com/office/drawing/2010/main" xmlns="" w="9525">
+                  <a14:hiddenLine xmlns="" xmlns:a14="http://schemas.microsoft.com/office/drawing/2010/main" w="9525">
                     <a:solidFill>
                       <a:srgbClr val="000000"/>
                     </a:solidFill>
@@ -10720,7 +10725,7 @@
               </a:ln>
               <a:extLst>
                 <a:ext uri="{91240B29-F687-4f45-9708-019B960494DF}">
-                  <a14:hiddenLine xmlns:a14="http://schemas.microsoft.com/office/drawing/2010/main" xmlns="" w="9525">
+                  <a14:hiddenLine xmlns="" xmlns:a14="http://schemas.microsoft.com/office/drawing/2010/main" w="9525">
                     <a:solidFill>
                       <a:srgbClr val="000000"/>
                     </a:solidFill>
@@ -10810,7 +10815,7 @@
               </a:ln>
               <a:extLst>
                 <a:ext uri="{91240B29-F687-4f45-9708-019B960494DF}">
-                  <a14:hiddenLine xmlns:a14="http://schemas.microsoft.com/office/drawing/2010/main" xmlns="" w="9525">
+                  <a14:hiddenLine xmlns="" xmlns:a14="http://schemas.microsoft.com/office/drawing/2010/main" w="9525">
                     <a:solidFill>
                       <a:srgbClr val="000000"/>
                     </a:solidFill>
@@ -10875,7 +10880,7 @@
               </a:ln>
               <a:extLst>
                 <a:ext uri="{91240B29-F687-4f45-9708-019B960494DF}">
-                  <a14:hiddenLine xmlns:a14="http://schemas.microsoft.com/office/drawing/2010/main" xmlns="" w="9525">
+                  <a14:hiddenLine xmlns="" xmlns:a14="http://schemas.microsoft.com/office/drawing/2010/main" w="9525">
                     <a:solidFill>
                       <a:srgbClr val="000000"/>
                     </a:solidFill>
@@ -10995,7 +11000,7 @@
               </a:ln>
               <a:extLst>
                 <a:ext uri="{91240B29-F687-4f45-9708-019B960494DF}">
-                  <a14:hiddenLine xmlns:a14="http://schemas.microsoft.com/office/drawing/2010/main" xmlns="" w="9525">
+                  <a14:hiddenLine xmlns="" xmlns:a14="http://schemas.microsoft.com/office/drawing/2010/main" w="9525">
                     <a:solidFill>
                       <a:srgbClr val="000000"/>
                     </a:solidFill>
@@ -11093,7 +11098,7 @@
               </a:ln>
               <a:extLst>
                 <a:ext uri="{91240B29-F687-4f45-9708-019B960494DF}">
-                  <a14:hiddenLine xmlns:a14="http://schemas.microsoft.com/office/drawing/2010/main" xmlns="" w="9525">
+                  <a14:hiddenLine xmlns="" xmlns:a14="http://schemas.microsoft.com/office/drawing/2010/main" w="9525">
                     <a:solidFill>
                       <a:srgbClr val="000000"/>
                     </a:solidFill>
@@ -11208,7 +11213,7 @@
               </a:ln>
               <a:extLst>
                 <a:ext uri="{91240B29-F687-4f45-9708-019B960494DF}">
-                  <a14:hiddenLine xmlns:a14="http://schemas.microsoft.com/office/drawing/2010/main" xmlns="" w="9525">
+                  <a14:hiddenLine xmlns="" xmlns:a14="http://schemas.microsoft.com/office/drawing/2010/main" w="9525">
                     <a:solidFill>
                       <a:srgbClr val="000000"/>
                     </a:solidFill>
@@ -11298,7 +11303,7 @@
               </a:ln>
               <a:extLst>
                 <a:ext uri="{91240B29-F687-4f45-9708-019B960494DF}">
-                  <a14:hiddenLine xmlns:a14="http://schemas.microsoft.com/office/drawing/2010/main" xmlns="" w="9525">
+                  <a14:hiddenLine xmlns="" xmlns:a14="http://schemas.microsoft.com/office/drawing/2010/main" w="9525">
                     <a:solidFill>
                       <a:srgbClr val="000000"/>
                     </a:solidFill>
@@ -11363,7 +11368,7 @@
               </a:ln>
               <a:extLst>
                 <a:ext uri="{91240B29-F687-4f45-9708-019B960494DF}">
-                  <a14:hiddenLine xmlns:a14="http://schemas.microsoft.com/office/drawing/2010/main" xmlns="" w="9525">
+                  <a14:hiddenLine xmlns="" xmlns:a14="http://schemas.microsoft.com/office/drawing/2010/main" w="9525">
                     <a:solidFill>
                       <a:srgbClr val="000000"/>
                     </a:solidFill>
@@ -11453,7 +11458,7 @@
               </a:ln>
               <a:extLst>
                 <a:ext uri="{91240B29-F687-4f45-9708-019B960494DF}">
-                  <a14:hiddenLine xmlns:a14="http://schemas.microsoft.com/office/drawing/2010/main" xmlns="" w="9525">
+                  <a14:hiddenLine xmlns="" xmlns:a14="http://schemas.microsoft.com/office/drawing/2010/main" w="9525">
                     <a:solidFill>
                       <a:srgbClr val="000000"/>
                     </a:solidFill>
@@ -11521,7 +11526,7 @@
               </a:ln>
               <a:extLst>
                 <a:ext uri="{91240B29-F687-4f45-9708-019B960494DF}">
-                  <a14:hiddenLine xmlns:a14="http://schemas.microsoft.com/office/drawing/2010/main" xmlns="" w="9525">
+                  <a14:hiddenLine xmlns="" xmlns:a14="http://schemas.microsoft.com/office/drawing/2010/main" w="9525">
                     <a:solidFill>
                       <a:srgbClr val="000000"/>
                     </a:solidFill>
@@ -11611,7 +11616,7 @@
               </a:ln>
               <a:extLst>
                 <a:ext uri="{91240B29-F687-4f45-9708-019B960494DF}">
-                  <a14:hiddenLine xmlns:a14="http://schemas.microsoft.com/office/drawing/2010/main" xmlns="" w="9525">
+                  <a14:hiddenLine xmlns="" xmlns:a14="http://schemas.microsoft.com/office/drawing/2010/main" w="9525">
                     <a:solidFill>
                       <a:srgbClr val="000000"/>
                     </a:solidFill>
@@ -11679,7 +11684,7 @@
               </a:ln>
               <a:extLst>
                 <a:ext uri="{91240B29-F687-4f45-9708-019B960494DF}">
-                  <a14:hiddenLine xmlns:a14="http://schemas.microsoft.com/office/drawing/2010/main" xmlns="" w="9525">
+                  <a14:hiddenLine xmlns="" xmlns:a14="http://schemas.microsoft.com/office/drawing/2010/main" w="9525">
                     <a:solidFill>
                       <a:srgbClr val="000000"/>
                     </a:solidFill>
@@ -11769,7 +11774,7 @@
               </a:ln>
               <a:extLst>
                 <a:ext uri="{91240B29-F687-4f45-9708-019B960494DF}">
-                  <a14:hiddenLine xmlns:a14="http://schemas.microsoft.com/office/drawing/2010/main" xmlns="" w="9525">
+                  <a14:hiddenLine xmlns="" xmlns:a14="http://schemas.microsoft.com/office/drawing/2010/main" w="9525">
                     <a:solidFill>
                       <a:srgbClr val="000000"/>
                     </a:solidFill>
@@ -11803,7 +11808,7 @@
               </a:ln>
               <a:extLst>
                 <a:ext uri="{91240B29-F687-4f45-9708-019B960494DF}">
-                  <a14:hiddenLine xmlns:a14="http://schemas.microsoft.com/office/drawing/2010/main" xmlns="" w="9525">
+                  <a14:hiddenLine xmlns="" xmlns:a14="http://schemas.microsoft.com/office/drawing/2010/main" w="9525">
                     <a:solidFill>
                       <a:srgbClr val="000000"/>
                     </a:solidFill>
@@ -11944,7 +11949,7 @@
             <a:fld id="{48A87A34-81AB-432B-8DAE-1953F412C126}" type="datetimeFigureOut">
               <a:rPr lang="en-US" dirty="0"/>
               <a:pPr/>
-              <a:t>9/8/2021</a:t>
+              <a:t>9/9/2021</a:t>
             </a:fld>
             <a:endParaRPr lang="en-US" dirty="0"/>
           </a:p>
@@ -14280,21 +14285,21 @@
           <a:p>
             <a:r>
               <a:rPr lang="en-US" dirty="0"/>
-              <a:t>Lab 1 is out…!</a:t>
+              <a:t>Labs 1 and 2 are out…!</a:t>
             </a:r>
           </a:p>
           <a:p>
             <a:pPr lvl="1"/>
             <a:r>
               <a:rPr lang="en-US" dirty="0"/>
-              <a:t>It’s a really easy one. All you have to do is show me that you have Java installed and can print “Hello world.” Due next Wednesday at 11:59! </a:t>
+              <a:t>They’re relatively easy – one is showing me you have Java installed and working, and another is answering some questions from lecture (open note!)</a:t>
             </a:r>
           </a:p>
           <a:p>
             <a:pPr lvl="1"/>
             <a:r>
               <a:rPr lang="en-US" dirty="0"/>
-              <a:t>Keep an eye on Canvas; it’ll be posted some time tonight (email me if Friday comes and I forgot to post the assignment). </a:t>
+              <a:t>Keep an eye on Canvas for further submission instructions; it’ll be posted some time tonight (email me if Friday comes and I forgot to post the assignment). </a:t>
             </a:r>
           </a:p>
           <a:p>

</xml_diff>